<commit_message>
clusters nor e naonorm
</commit_message>
<xml_diff>
--- a/personas.pptx
+++ b/personas.pptx
@@ -262,7 +262,7 @@
           <a:p>
             <a:fld id="{4E9674D3-0435-4608-83F2-3F2DAC3EFC55}" type="datetimeFigureOut">
               <a:rPr lang="pt-BR" smtClean="0"/>
-              <a:t>15/01/2022</a:t>
+              <a:t>22/01/2022</a:t>
             </a:fld>
             <a:endParaRPr lang="pt-BR"/>
           </a:p>
@@ -460,7 +460,7 @@
           <a:p>
             <a:fld id="{4E9674D3-0435-4608-83F2-3F2DAC3EFC55}" type="datetimeFigureOut">
               <a:rPr lang="pt-BR" smtClean="0"/>
-              <a:t>15/01/2022</a:t>
+              <a:t>22/01/2022</a:t>
             </a:fld>
             <a:endParaRPr lang="pt-BR"/>
           </a:p>
@@ -668,7 +668,7 @@
           <a:p>
             <a:fld id="{4E9674D3-0435-4608-83F2-3F2DAC3EFC55}" type="datetimeFigureOut">
               <a:rPr lang="pt-BR" smtClean="0"/>
-              <a:t>15/01/2022</a:t>
+              <a:t>22/01/2022</a:t>
             </a:fld>
             <a:endParaRPr lang="pt-BR"/>
           </a:p>
@@ -866,7 +866,7 @@
           <a:p>
             <a:fld id="{4E9674D3-0435-4608-83F2-3F2DAC3EFC55}" type="datetimeFigureOut">
               <a:rPr lang="pt-BR" smtClean="0"/>
-              <a:t>15/01/2022</a:t>
+              <a:t>22/01/2022</a:t>
             </a:fld>
             <a:endParaRPr lang="pt-BR"/>
           </a:p>
@@ -1141,7 +1141,7 @@
           <a:p>
             <a:fld id="{4E9674D3-0435-4608-83F2-3F2DAC3EFC55}" type="datetimeFigureOut">
               <a:rPr lang="pt-BR" smtClean="0"/>
-              <a:t>15/01/2022</a:t>
+              <a:t>22/01/2022</a:t>
             </a:fld>
             <a:endParaRPr lang="pt-BR"/>
           </a:p>
@@ -1406,7 +1406,7 @@
           <a:p>
             <a:fld id="{4E9674D3-0435-4608-83F2-3F2DAC3EFC55}" type="datetimeFigureOut">
               <a:rPr lang="pt-BR" smtClean="0"/>
-              <a:t>15/01/2022</a:t>
+              <a:t>22/01/2022</a:t>
             </a:fld>
             <a:endParaRPr lang="pt-BR"/>
           </a:p>
@@ -1818,7 +1818,7 @@
           <a:p>
             <a:fld id="{4E9674D3-0435-4608-83F2-3F2DAC3EFC55}" type="datetimeFigureOut">
               <a:rPr lang="pt-BR" smtClean="0"/>
-              <a:t>15/01/2022</a:t>
+              <a:t>22/01/2022</a:t>
             </a:fld>
             <a:endParaRPr lang="pt-BR"/>
           </a:p>
@@ -1959,7 +1959,7 @@
           <a:p>
             <a:fld id="{4E9674D3-0435-4608-83F2-3F2DAC3EFC55}" type="datetimeFigureOut">
               <a:rPr lang="pt-BR" smtClean="0"/>
-              <a:t>15/01/2022</a:t>
+              <a:t>22/01/2022</a:t>
             </a:fld>
             <a:endParaRPr lang="pt-BR"/>
           </a:p>
@@ -2072,7 +2072,7 @@
           <a:p>
             <a:fld id="{4E9674D3-0435-4608-83F2-3F2DAC3EFC55}" type="datetimeFigureOut">
               <a:rPr lang="pt-BR" smtClean="0"/>
-              <a:t>15/01/2022</a:t>
+              <a:t>22/01/2022</a:t>
             </a:fld>
             <a:endParaRPr lang="pt-BR"/>
           </a:p>
@@ -2383,7 +2383,7 @@
           <a:p>
             <a:fld id="{4E9674D3-0435-4608-83F2-3F2DAC3EFC55}" type="datetimeFigureOut">
               <a:rPr lang="pt-BR" smtClean="0"/>
-              <a:t>15/01/2022</a:t>
+              <a:t>22/01/2022</a:t>
             </a:fld>
             <a:endParaRPr lang="pt-BR"/>
           </a:p>
@@ -2671,7 +2671,7 @@
           <a:p>
             <a:fld id="{4E9674D3-0435-4608-83F2-3F2DAC3EFC55}" type="datetimeFigureOut">
               <a:rPr lang="pt-BR" smtClean="0"/>
-              <a:t>15/01/2022</a:t>
+              <a:t>22/01/2022</a:t>
             </a:fld>
             <a:endParaRPr lang="pt-BR"/>
           </a:p>
@@ -2912,7 +2912,7 @@
           <a:p>
             <a:fld id="{4E9674D3-0435-4608-83F2-3F2DAC3EFC55}" type="datetimeFigureOut">
               <a:rPr lang="pt-BR" smtClean="0"/>
-              <a:t>15/01/2022</a:t>
+              <a:t>22/01/2022</a:t>
             </a:fld>
             <a:endParaRPr lang="pt-BR"/>
           </a:p>

</xml_diff>